<commit_message>
fix table data reset issue
change nose to pytest
add pytest-cov
add codecov action in workflow
</commit_message>
<xml_diff>
--- a/src/tests/data_replace/table_replace.pptx
+++ b/src/tests/data_replace/table_replace.pptx
@@ -7,6 +7,7 @@
   <p:sldIdLst>
     <p:sldId id="256" r:id="rId2"/>
     <p:sldId id="257" r:id="rId3"/>
+    <p:sldId id="258" r:id="rId4"/>
   </p:sldIdLst>
   <p:sldSz cx="12192000" cy="6858000"/>
   <p:notesSz cx="6858000" cy="9144000"/>
@@ -319,7 +320,7 @@
           <a:p>
             <a:fld id="{00202286-A9FB-ED43-A3D2-0EC1A1169186}" type="datetimeFigureOut">
               <a:rPr kumimoji="1" lang="ko-KR" altLang="en-US" smtClean="0"/>
-              <a:t>2020. 7. 8.</a:t>
+              <a:t>2020. 7. 13.</a:t>
             </a:fld>
             <a:endParaRPr kumimoji="1" lang="ko-KR" altLang="en-US"/>
           </a:p>
@@ -1368,6 +1369,368 @@
     <p:extLst>
       <p:ext uri="{BB962C8B-B14F-4D97-AF65-F5344CB8AC3E}">
         <p14:creationId xmlns:p14="http://schemas.microsoft.com/office/powerpoint/2010/main" val="376855581"/>
+      </p:ext>
+    </p:extLst>
+  </p:cSld>
+  <p:clrMapOvr>
+    <a:masterClrMapping/>
+  </p:clrMapOvr>
+</p:sld>
+</file>
+
+<file path=ppt/slides/slide3.xml><?xml version="1.0" encoding="utf-8"?>
+<p:sld xmlns:a="http://schemas.openxmlformats.org/drawingml/2006/main" xmlns:r="http://schemas.openxmlformats.org/officeDocument/2006/relationships" xmlns:p="http://schemas.openxmlformats.org/presentationml/2006/main">
+  <p:cSld>
+    <p:spTree>
+      <p:nvGrpSpPr>
+        <p:cNvPr id="1" name=""/>
+        <p:cNvGrpSpPr/>
+        <p:nvPr/>
+      </p:nvGrpSpPr>
+      <p:grpSpPr>
+        <a:xfrm>
+          <a:off x="0" y="0"/>
+          <a:ext cx="0" cy="0"/>
+          <a:chOff x="0" y="0"/>
+          <a:chExt cx="0" cy="0"/>
+        </a:xfrm>
+      </p:grpSpPr>
+      <p:graphicFrame>
+        <p:nvGraphicFramePr>
+          <p:cNvPr id="4" name="table">
+            <a:extLst>
+              <a:ext uri="{FF2B5EF4-FFF2-40B4-BE49-F238E27FC236}">
+                <a16:creationId xmlns:a16="http://schemas.microsoft.com/office/drawing/2014/main" id="{F493D967-2561-3A40-9994-AAD1895FCB2D}"/>
+              </a:ext>
+            </a:extLst>
+          </p:cNvPr>
+          <p:cNvGraphicFramePr>
+            <a:graphicFrameLocks noGrp="1"/>
+          </p:cNvGraphicFramePr>
+          <p:nvPr>
+            <p:extLst>
+              <p:ext uri="{D42A27DB-BD31-4B8C-83A1-F6EECF244321}">
+                <p14:modId xmlns:p14="http://schemas.microsoft.com/office/powerpoint/2010/main" val="753424195"/>
+              </p:ext>
+            </p:extLst>
+          </p:nvPr>
+        </p:nvGraphicFramePr>
+        <p:xfrm>
+          <a:off x="987696" y="1352257"/>
+          <a:ext cx="8913542" cy="1800297"/>
+        </p:xfrm>
+        <a:graphic>
+          <a:graphicData uri="http://schemas.openxmlformats.org/drawingml/2006/table">
+            <a:tbl>
+              <a:tblPr firstRow="1" bandRow="1">
+                <a:tableStyleId>{5C22544A-7EE6-4342-B048-85BDC9FD1C3A}</a:tableStyleId>
+              </a:tblPr>
+              <a:tblGrid>
+                <a:gridCol w="2228386">
+                  <a:extLst>
+                    <a:ext uri="{9D8B030D-6E8A-4147-A177-3AD203B41FA5}">
+                      <a16:colId xmlns:a16="http://schemas.microsoft.com/office/drawing/2014/main" val="517248917"/>
+                    </a:ext>
+                  </a:extLst>
+                </a:gridCol>
+                <a:gridCol w="4017012">
+                  <a:extLst>
+                    <a:ext uri="{9D8B030D-6E8A-4147-A177-3AD203B41FA5}">
+                      <a16:colId xmlns:a16="http://schemas.microsoft.com/office/drawing/2014/main" val="1677400080"/>
+                    </a:ext>
+                  </a:extLst>
+                </a:gridCol>
+                <a:gridCol w="1602957">
+                  <a:extLst>
+                    <a:ext uri="{9D8B030D-6E8A-4147-A177-3AD203B41FA5}">
+                      <a16:colId xmlns:a16="http://schemas.microsoft.com/office/drawing/2014/main" val="1271119467"/>
+                    </a:ext>
+                  </a:extLst>
+                </a:gridCol>
+                <a:gridCol w="1065187">
+                  <a:extLst>
+                    <a:ext uri="{9D8B030D-6E8A-4147-A177-3AD203B41FA5}">
+                      <a16:colId xmlns:a16="http://schemas.microsoft.com/office/drawing/2014/main" val="2220910836"/>
+                    </a:ext>
+                  </a:extLst>
+                </a:gridCol>
+              </a:tblGrid>
+              <a:tr h="365464">
+                <a:tc>
+                  <a:txBody>
+                    <a:bodyPr/>
+                    <a:lstStyle/>
+                    <a:p>
+                      <a:pPr algn="ctr" latinLnBrk="1"/>
+                      <a:r>
+                        <a:rPr lang="en-US" altLang="ko-KR" dirty="0"/>
+                        <a:t>1</a:t>
+                      </a:r>
+                      <a:endParaRPr lang="ko-KR" altLang="en-US" dirty="0"/>
+                    </a:p>
+                  </a:txBody>
+                  <a:tcPr anchor="ctr"/>
+                </a:tc>
+                <a:tc>
+                  <a:txBody>
+                    <a:bodyPr/>
+                    <a:lstStyle/>
+                    <a:p>
+                      <a:pPr algn="ctr" latinLnBrk="1"/>
+                      <a:r>
+                        <a:rPr lang="en-US" altLang="ko-KR" dirty="0"/>
+                        <a:t>2</a:t>
+                      </a:r>
+                      <a:endParaRPr lang="ko-KR" altLang="en-US" dirty="0"/>
+                    </a:p>
+                  </a:txBody>
+                  <a:tcPr anchor="ctr"/>
+                </a:tc>
+                <a:tc>
+                  <a:txBody>
+                    <a:bodyPr/>
+                    <a:lstStyle/>
+                    <a:p>
+                      <a:pPr algn="ctr" latinLnBrk="1"/>
+                      <a:r>
+                        <a:rPr lang="en-US" altLang="ko-KR" dirty="0"/>
+                        <a:t>3</a:t>
+                      </a:r>
+                      <a:endParaRPr lang="ko-KR" altLang="en-US" dirty="0"/>
+                    </a:p>
+                  </a:txBody>
+                  <a:tcPr anchor="ctr"/>
+                </a:tc>
+                <a:tc>
+                  <a:txBody>
+                    <a:bodyPr/>
+                    <a:lstStyle/>
+                    <a:p>
+                      <a:pPr algn="ctr" latinLnBrk="1"/>
+                      <a:r>
+                        <a:rPr lang="en-US" altLang="ko-KR" dirty="0"/>
+                        <a:t>4</a:t>
+                      </a:r>
+                      <a:endParaRPr lang="ko-KR" altLang="en-US" dirty="0"/>
+                    </a:p>
+                  </a:txBody>
+                  <a:tcPr anchor="ctr"/>
+                </a:tc>
+                <a:extLst>
+                  <a:ext uri="{0D108BD9-81ED-4DB2-BD59-A6C34878D82A}">
+                    <a16:rowId xmlns:a16="http://schemas.microsoft.com/office/drawing/2014/main" val="768100179"/>
+                  </a:ext>
+                </a:extLst>
+              </a:tr>
+              <a:tr h="478179">
+                <a:tc>
+                  <a:txBody>
+                    <a:bodyPr/>
+                    <a:lstStyle/>
+                    <a:p>
+                      <a:pPr algn="ctr" latinLnBrk="1"/>
+                      <a:r>
+                        <a:rPr lang="en-US" altLang="ko-KR" dirty="0"/>
+                        <a:t>a</a:t>
+                      </a:r>
+                      <a:endParaRPr lang="ko-KR" altLang="en-US" dirty="0"/>
+                    </a:p>
+                  </a:txBody>
+                  <a:tcPr anchor="ctr"/>
+                </a:tc>
+                <a:tc>
+                  <a:txBody>
+                    <a:bodyPr/>
+                    <a:lstStyle/>
+                    <a:p>
+                      <a:pPr algn="ctr" latinLnBrk="1"/>
+                      <a:r>
+                        <a:rPr lang="en-US" altLang="ko-KR" dirty="0"/>
+                        <a:t>b</a:t>
+                      </a:r>
+                      <a:endParaRPr lang="ko-KR" altLang="en-US" dirty="0"/>
+                    </a:p>
+                  </a:txBody>
+                  <a:tcPr anchor="ctr"/>
+                </a:tc>
+                <a:tc>
+                  <a:txBody>
+                    <a:bodyPr/>
+                    <a:lstStyle/>
+                    <a:p>
+                      <a:pPr algn="ctr" latinLnBrk="1"/>
+                      <a:r>
+                        <a:rPr lang="en-US" altLang="ko-KR" dirty="0"/>
+                        <a:t>c</a:t>
+                      </a:r>
+                      <a:endParaRPr lang="ko-KR" altLang="en-US" dirty="0"/>
+                    </a:p>
+                  </a:txBody>
+                  <a:tcPr anchor="ctr"/>
+                </a:tc>
+                <a:tc>
+                  <a:txBody>
+                    <a:bodyPr/>
+                    <a:lstStyle/>
+                    <a:p>
+                      <a:pPr algn="ctr" latinLnBrk="1"/>
+                      <a:r>
+                        <a:rPr lang="en-US" altLang="ko-KR" dirty="0"/>
+                        <a:t>d</a:t>
+                      </a:r>
+                      <a:endParaRPr lang="ko-KR" altLang="en-US" dirty="0"/>
+                    </a:p>
+                  </a:txBody>
+                  <a:tcPr anchor="ctr"/>
+                </a:tc>
+                <a:extLst>
+                  <a:ext uri="{0D108BD9-81ED-4DB2-BD59-A6C34878D82A}">
+                    <a16:rowId xmlns:a16="http://schemas.microsoft.com/office/drawing/2014/main" val="3906287158"/>
+                  </a:ext>
+                </a:extLst>
+              </a:tr>
+              <a:tr h="478179">
+                <a:tc>
+                  <a:txBody>
+                    <a:bodyPr/>
+                    <a:lstStyle/>
+                    <a:p>
+                      <a:pPr algn="ctr" latinLnBrk="1"/>
+                      <a:r>
+                        <a:rPr lang="en-US" altLang="ko-KR" dirty="0"/>
+                        <a:t>d</a:t>
+                      </a:r>
+                      <a:endParaRPr lang="ko-KR" altLang="en-US" dirty="0"/>
+                    </a:p>
+                  </a:txBody>
+                  <a:tcPr anchor="ctr"/>
+                </a:tc>
+                <a:tc>
+                  <a:txBody>
+                    <a:bodyPr/>
+                    <a:lstStyle/>
+                    <a:p>
+                      <a:pPr algn="ctr" latinLnBrk="1"/>
+                      <a:r>
+                        <a:rPr lang="en-US" altLang="ko-KR" dirty="0"/>
+                        <a:t>f</a:t>
+                      </a:r>
+                      <a:endParaRPr lang="ko-KR" altLang="en-US" dirty="0"/>
+                    </a:p>
+                  </a:txBody>
+                  <a:tcPr anchor="ctr"/>
+                </a:tc>
+                <a:tc>
+                  <a:txBody>
+                    <a:bodyPr/>
+                    <a:lstStyle/>
+                    <a:p>
+                      <a:pPr algn="ctr" latinLnBrk="1"/>
+                      <a:r>
+                        <a:rPr lang="en-US" altLang="ko-KR" dirty="0"/>
+                        <a:t>g</a:t>
+                      </a:r>
+                      <a:endParaRPr lang="ko-KR" altLang="en-US" dirty="0"/>
+                    </a:p>
+                  </a:txBody>
+                  <a:tcPr anchor="ctr"/>
+                </a:tc>
+                <a:tc>
+                  <a:txBody>
+                    <a:bodyPr/>
+                    <a:lstStyle/>
+                    <a:p>
+                      <a:pPr algn="ctr" latinLnBrk="1"/>
+                      <a:r>
+                        <a:rPr lang="en-US" altLang="ko-KR" dirty="0"/>
+                        <a:t>h</a:t>
+                      </a:r>
+                      <a:endParaRPr lang="ko-KR" altLang="en-US" dirty="0"/>
+                    </a:p>
+                  </a:txBody>
+                  <a:tcPr anchor="ctr"/>
+                </a:tc>
+                <a:extLst>
+                  <a:ext uri="{0D108BD9-81ED-4DB2-BD59-A6C34878D82A}">
+                    <a16:rowId xmlns:a16="http://schemas.microsoft.com/office/drawing/2014/main" val="2307303287"/>
+                  </a:ext>
+                </a:extLst>
+              </a:tr>
+              <a:tr h="478179">
+                <a:tc>
+                  <a:txBody>
+                    <a:bodyPr/>
+                    <a:lstStyle/>
+                    <a:p>
+                      <a:pPr algn="ctr" latinLnBrk="1"/>
+                      <a:r>
+                        <a:rPr lang="en-US" altLang="ko-KR" dirty="0" err="1"/>
+                        <a:t>i</a:t>
+                      </a:r>
+                      <a:endParaRPr lang="ko-KR" altLang="en-US" dirty="0"/>
+                    </a:p>
+                  </a:txBody>
+                  <a:tcPr anchor="ctr"/>
+                </a:tc>
+                <a:tc>
+                  <a:txBody>
+                    <a:bodyPr/>
+                    <a:lstStyle/>
+                    <a:p>
+                      <a:pPr algn="ctr" latinLnBrk="1"/>
+                      <a:r>
+                        <a:rPr lang="en-US" altLang="ko-KR" dirty="0"/>
+                        <a:t>j</a:t>
+                      </a:r>
+                      <a:endParaRPr lang="ko-KR" altLang="en-US" dirty="0"/>
+                    </a:p>
+                  </a:txBody>
+                  <a:tcPr anchor="ctr"/>
+                </a:tc>
+                <a:tc>
+                  <a:txBody>
+                    <a:bodyPr/>
+                    <a:lstStyle/>
+                    <a:p>
+                      <a:pPr algn="ctr" latinLnBrk="1"/>
+                      <a:r>
+                        <a:rPr lang="en-US" altLang="ko-KR" dirty="0"/>
+                        <a:t>k</a:t>
+                      </a:r>
+                      <a:endParaRPr lang="ko-KR" altLang="en-US" dirty="0"/>
+                    </a:p>
+                  </a:txBody>
+                  <a:tcPr anchor="ctr"/>
+                </a:tc>
+                <a:tc>
+                  <a:txBody>
+                    <a:bodyPr/>
+                    <a:lstStyle/>
+                    <a:p>
+                      <a:pPr algn="ctr" latinLnBrk="1"/>
+                      <a:r>
+                        <a:rPr lang="en-US" altLang="ko-KR" dirty="0"/>
+                        <a:t>l</a:t>
+                      </a:r>
+                      <a:endParaRPr lang="ko-KR" altLang="en-US" dirty="0"/>
+                    </a:p>
+                  </a:txBody>
+                  <a:tcPr anchor="ctr"/>
+                </a:tc>
+                <a:extLst>
+                  <a:ext uri="{0D108BD9-81ED-4DB2-BD59-A6C34878D82A}">
+                    <a16:rowId xmlns:a16="http://schemas.microsoft.com/office/drawing/2014/main" val="57669659"/>
+                  </a:ext>
+                </a:extLst>
+              </a:tr>
+            </a:tbl>
+          </a:graphicData>
+        </a:graphic>
+      </p:graphicFrame>
+    </p:spTree>
+    <p:extLst>
+      <p:ext uri="{BB962C8B-B14F-4D97-AF65-F5344CB8AC3E}">
+        <p14:creationId xmlns:p14="http://schemas.microsoft.com/office/powerpoint/2010/main" val="3985302483"/>
       </p:ext>
     </p:extLst>
   </p:cSld>

</xml_diff>